<commit_message>
Update source codes and document
This update includes design changes for 1 master to 4 slaves.
</commit_message>
<xml_diff>
--- a/Docs/thermal_controller_blockdiagram.pptx
+++ b/Docs/thermal_controller_blockdiagram.pptx
@@ -5,7 +5,7 @@
     <p:sldMasterId id="2147483648" r:id="rId5"/>
   </p:sldMasterIdLst>
   <p:notesMasterIdLst>
-    <p:notesMasterId r:id="rId18"/>
+    <p:notesMasterId r:id="rId19"/>
   </p:notesMasterIdLst>
   <p:sldIdLst>
     <p:sldId id="3535" r:id="rId6"/>
@@ -17,9 +17,10 @@
     <p:sldId id="3531" r:id="rId12"/>
     <p:sldId id="3538" r:id="rId13"/>
     <p:sldId id="3536" r:id="rId14"/>
-    <p:sldId id="3534" r:id="rId15"/>
-    <p:sldId id="3532" r:id="rId16"/>
-    <p:sldId id="3533" r:id="rId17"/>
+    <p:sldId id="3539" r:id="rId15"/>
+    <p:sldId id="3534" r:id="rId16"/>
+    <p:sldId id="3532" r:id="rId17"/>
+    <p:sldId id="3533" r:id="rId18"/>
   </p:sldIdLst>
   <p:sldSz cx="12192000" cy="6858000"/>
   <p:notesSz cx="6797675" cy="9926638"/>
@@ -220,7 +221,7 @@
           <a:p>
             <a:fld id="{8A2540B5-C657-4695-96F0-0059BA46A3EC}" type="datetimeFigureOut">
               <a:rPr lang="en-US" smtClean="0"/>
-              <a:t>11/21/2022</a:t>
+              <a:t>12/16/2022</a:t>
             </a:fld>
             <a:endParaRPr lang="en-US"/>
           </a:p>
@@ -723,7 +724,7 @@
           <a:p>
             <a:fld id="{D7A1C63D-6A0D-4A97-AF70-6DEF9E93A01A}" type="slidenum">
               <a:rPr lang="en-US" smtClean="0"/>
-              <a:t>12</a:t>
+              <a:t>13</a:t>
             </a:fld>
             <a:endParaRPr lang="en-US"/>
           </a:p>
@@ -1014,7 +1015,7 @@
           <a:p>
             <a:fld id="{CD9FC7CE-19E2-4257-9F45-8977FC4F3E4A}" type="datetimeFigureOut">
               <a:rPr lang="en-US" smtClean="0"/>
-              <a:t>11/21/2022</a:t>
+              <a:t>12/16/2022</a:t>
             </a:fld>
             <a:endParaRPr lang="en-US"/>
           </a:p>
@@ -1323,7 +1324,7 @@
           <a:p>
             <a:fld id="{CD9FC7CE-19E2-4257-9F45-8977FC4F3E4A}" type="datetimeFigureOut">
               <a:rPr lang="en-US" smtClean="0"/>
-              <a:t>11/21/2022</a:t>
+              <a:t>12/16/2022</a:t>
             </a:fld>
             <a:endParaRPr lang="en-US"/>
           </a:p>
@@ -1539,7 +1540,7 @@
           <a:p>
             <a:fld id="{CD9FC7CE-19E2-4257-9F45-8977FC4F3E4A}" type="datetimeFigureOut">
               <a:rPr lang="en-US" smtClean="0"/>
-              <a:t>11/21/2022</a:t>
+              <a:t>12/16/2022</a:t>
             </a:fld>
             <a:endParaRPr lang="en-US"/>
           </a:p>
@@ -1939,7 +1940,7 @@
           <a:p>
             <a:fld id="{CD9FC7CE-19E2-4257-9F45-8977FC4F3E4A}" type="datetimeFigureOut">
               <a:rPr lang="en-US" smtClean="0"/>
-              <a:t>11/21/2022</a:t>
+              <a:t>12/16/2022</a:t>
             </a:fld>
             <a:endParaRPr lang="en-US"/>
           </a:p>
@@ -2056,7 +2057,7 @@
           <a:p>
             <a:fld id="{CD9FC7CE-19E2-4257-9F45-8977FC4F3E4A}" type="datetimeFigureOut">
               <a:rPr lang="en-US" smtClean="0"/>
-              <a:t>11/21/2022</a:t>
+              <a:t>12/16/2022</a:t>
             </a:fld>
             <a:endParaRPr lang="en-US"/>
           </a:p>
@@ -2151,7 +2152,7 @@
           <a:p>
             <a:fld id="{CD9FC7CE-19E2-4257-9F45-8977FC4F3E4A}" type="datetimeFigureOut">
               <a:rPr lang="en-US" smtClean="0"/>
-              <a:t>11/21/2022</a:t>
+              <a:t>12/16/2022</a:t>
             </a:fld>
             <a:endParaRPr lang="en-US"/>
           </a:p>
@@ -2378,7 +2379,7 @@
           <a:p>
             <a:fld id="{CD9FC7CE-19E2-4257-9F45-8977FC4F3E4A}" type="datetimeFigureOut">
               <a:rPr lang="en-US" smtClean="0"/>
-              <a:t>11/21/2022</a:t>
+              <a:t>12/16/2022</a:t>
             </a:fld>
             <a:endParaRPr lang="en-US" dirty="0"/>
           </a:p>
@@ -2896,44 +2897,815 @@
       </p:grpSpPr>
       <p:sp>
         <p:nvSpPr>
-          <p:cNvPr id="2" name="TextBox 1">
-            <a:extLst>
-              <a:ext uri="{FF2B5EF4-FFF2-40B4-BE49-F238E27FC236}">
-                <a16:creationId xmlns:a16="http://schemas.microsoft.com/office/drawing/2014/main" id="{0C77847F-94E9-45BD-B42B-0F7EA47639CA}"/>
-              </a:ext>
-            </a:extLst>
-          </p:cNvPr>
-          <p:cNvSpPr txBox="1"/>
-          <p:nvPr/>
-        </p:nvSpPr>
-        <p:spPr>
-          <a:xfrm>
-            <a:off x="2048417" y="2105561"/>
-            <a:ext cx="8095165" cy="1323439"/>
-          </a:xfrm>
-          <a:prstGeom prst="rect">
-            <a:avLst/>
-          </a:prstGeom>
-          <a:noFill/>
-        </p:spPr>
-        <p:txBody>
-          <a:bodyPr wrap="none" rtlCol="0">
-            <a:spAutoFit/>
-          </a:bodyPr>
-          <a:lstStyle/>
-          <a:p>
-            <a:r>
-              <a:rPr lang="en-US" sz="8000" dirty="0"/>
-              <a:t>Program Flowchart</a:t>
-            </a:r>
-            <a:endParaRPr lang="en-SG" sz="8000" dirty="0"/>
-          </a:p>
-        </p:txBody>
-      </p:sp>
+          <p:cNvPr id="4" name="Rectangle: Rounded Corners 3">
+            <a:extLst>
+              <a:ext uri="{FF2B5EF4-FFF2-40B4-BE49-F238E27FC236}">
+                <a16:creationId xmlns:a16="http://schemas.microsoft.com/office/drawing/2014/main" id="{93540440-8B0B-45A6-86C5-BDB4D40B3803}"/>
+              </a:ext>
+            </a:extLst>
+          </p:cNvPr>
+          <p:cNvSpPr/>
+          <p:nvPr/>
+        </p:nvSpPr>
+        <p:spPr>
+          <a:xfrm>
+            <a:off x="1055480" y="1299733"/>
+            <a:ext cx="2107964" cy="1158373"/>
+          </a:xfrm>
+          <a:prstGeom prst="roundRect">
+            <a:avLst/>
+          </a:prstGeom>
+          <a:solidFill>
+            <a:srgbClr val="FFC000"/>
+          </a:solidFill>
+        </p:spPr>
+        <p:style>
+          <a:lnRef idx="2">
+            <a:schemeClr val="accent1">
+              <a:shade val="50000"/>
+            </a:schemeClr>
+          </a:lnRef>
+          <a:fillRef idx="1">
+            <a:schemeClr val="accent1"/>
+          </a:fillRef>
+          <a:effectRef idx="0">
+            <a:schemeClr val="accent1"/>
+          </a:effectRef>
+          <a:fontRef idx="minor">
+            <a:schemeClr val="lt1"/>
+          </a:fontRef>
+        </p:style>
+        <p:txBody>
+          <a:bodyPr rtlCol="0" anchor="b" anchorCtr="0"/>
+          <a:lstStyle/>
+          <a:p>
+            <a:pPr algn="ctr"/>
+            <a:r>
+              <a:rPr lang="en-US" sz="2400" b="1" dirty="0">
+                <a:solidFill>
+                  <a:schemeClr val="tx1"/>
+                </a:solidFill>
+              </a:rPr>
+              <a:t>Slave 1</a:t>
+            </a:r>
+            <a:endParaRPr lang="en-SG" sz="2400" b="1" dirty="0">
+              <a:solidFill>
+                <a:schemeClr val="tx1"/>
+              </a:solidFill>
+            </a:endParaRPr>
+          </a:p>
+        </p:txBody>
+      </p:sp>
+      <p:sp>
+        <p:nvSpPr>
+          <p:cNvPr id="5" name="Rectangle 4">
+            <a:extLst>
+              <a:ext uri="{FF2B5EF4-FFF2-40B4-BE49-F238E27FC236}">
+                <a16:creationId xmlns:a16="http://schemas.microsoft.com/office/drawing/2014/main" id="{DDA71969-CC4C-471E-85F8-92D45099BA3D}"/>
+              </a:ext>
+            </a:extLst>
+          </p:cNvPr>
+          <p:cNvSpPr/>
+          <p:nvPr/>
+        </p:nvSpPr>
+        <p:spPr>
+          <a:xfrm>
+            <a:off x="1238794" y="1530321"/>
+            <a:ext cx="1741336" cy="417065"/>
+          </a:xfrm>
+          <a:prstGeom prst="rect">
+            <a:avLst/>
+          </a:prstGeom>
+          <a:noFill/>
+          <a:ln w="38100">
+            <a:solidFill>
+              <a:schemeClr val="tx1"/>
+            </a:solidFill>
+          </a:ln>
+        </p:spPr>
+        <p:style>
+          <a:lnRef idx="2">
+            <a:schemeClr val="accent1">
+              <a:shade val="50000"/>
+            </a:schemeClr>
+          </a:lnRef>
+          <a:fillRef idx="1">
+            <a:schemeClr val="accent1"/>
+          </a:fillRef>
+          <a:effectRef idx="0">
+            <a:schemeClr val="accent1"/>
+          </a:effectRef>
+          <a:fontRef idx="minor">
+            <a:schemeClr val="lt1"/>
+          </a:fontRef>
+        </p:style>
+        <p:txBody>
+          <a:bodyPr rtlCol="0" anchor="ctr"/>
+          <a:lstStyle/>
+          <a:p>
+            <a:pPr algn="ctr"/>
+            <a:r>
+              <a:rPr lang="en-US" b="1" dirty="0">
+                <a:solidFill>
+                  <a:schemeClr val="tx1"/>
+                </a:solidFill>
+              </a:rPr>
+              <a:t>Max485 Module</a:t>
+            </a:r>
+            <a:endParaRPr lang="en-SG" b="1" dirty="0">
+              <a:solidFill>
+                <a:schemeClr val="tx1"/>
+              </a:solidFill>
+            </a:endParaRPr>
+          </a:p>
+        </p:txBody>
+      </p:sp>
+      <p:sp>
+        <p:nvSpPr>
+          <p:cNvPr id="8" name="Rectangle: Rounded Corners 7">
+            <a:extLst>
+              <a:ext uri="{FF2B5EF4-FFF2-40B4-BE49-F238E27FC236}">
+                <a16:creationId xmlns:a16="http://schemas.microsoft.com/office/drawing/2014/main" id="{44A2E244-93BA-48E7-B4B5-2B03C00863E2}"/>
+              </a:ext>
+            </a:extLst>
+          </p:cNvPr>
+          <p:cNvSpPr/>
+          <p:nvPr/>
+        </p:nvSpPr>
+        <p:spPr>
+          <a:xfrm>
+            <a:off x="1055480" y="3570020"/>
+            <a:ext cx="2107964" cy="1158373"/>
+          </a:xfrm>
+          <a:prstGeom prst="roundRect">
+            <a:avLst/>
+          </a:prstGeom>
+          <a:solidFill>
+            <a:srgbClr val="FFC000"/>
+          </a:solidFill>
+        </p:spPr>
+        <p:style>
+          <a:lnRef idx="2">
+            <a:schemeClr val="accent1">
+              <a:shade val="50000"/>
+            </a:schemeClr>
+          </a:lnRef>
+          <a:fillRef idx="1">
+            <a:schemeClr val="accent1"/>
+          </a:fillRef>
+          <a:effectRef idx="0">
+            <a:schemeClr val="accent1"/>
+          </a:effectRef>
+          <a:fontRef idx="minor">
+            <a:schemeClr val="lt1"/>
+          </a:fontRef>
+        </p:style>
+        <p:txBody>
+          <a:bodyPr rtlCol="0" anchor="b" anchorCtr="0"/>
+          <a:lstStyle/>
+          <a:p>
+            <a:pPr algn="ctr"/>
+            <a:r>
+              <a:rPr lang="en-US" sz="2400" b="1" dirty="0">
+                <a:solidFill>
+                  <a:schemeClr val="tx1"/>
+                </a:solidFill>
+              </a:rPr>
+              <a:t>Slave 4</a:t>
+            </a:r>
+            <a:endParaRPr lang="en-SG" sz="2400" b="1" dirty="0">
+              <a:solidFill>
+                <a:schemeClr val="tx1"/>
+              </a:solidFill>
+            </a:endParaRPr>
+          </a:p>
+        </p:txBody>
+      </p:sp>
+      <p:sp>
+        <p:nvSpPr>
+          <p:cNvPr id="9" name="Rectangle 8">
+            <a:extLst>
+              <a:ext uri="{FF2B5EF4-FFF2-40B4-BE49-F238E27FC236}">
+                <a16:creationId xmlns:a16="http://schemas.microsoft.com/office/drawing/2014/main" id="{7BD35586-81E3-4C18-A716-3F9D2207F178}"/>
+              </a:ext>
+            </a:extLst>
+          </p:cNvPr>
+          <p:cNvSpPr/>
+          <p:nvPr/>
+        </p:nvSpPr>
+        <p:spPr>
+          <a:xfrm>
+            <a:off x="1238794" y="3800608"/>
+            <a:ext cx="1741336" cy="417065"/>
+          </a:xfrm>
+          <a:prstGeom prst="rect">
+            <a:avLst/>
+          </a:prstGeom>
+          <a:noFill/>
+          <a:ln w="38100">
+            <a:solidFill>
+              <a:schemeClr val="tx1"/>
+            </a:solidFill>
+          </a:ln>
+        </p:spPr>
+        <p:style>
+          <a:lnRef idx="2">
+            <a:schemeClr val="accent1">
+              <a:shade val="50000"/>
+            </a:schemeClr>
+          </a:lnRef>
+          <a:fillRef idx="1">
+            <a:schemeClr val="accent1"/>
+          </a:fillRef>
+          <a:effectRef idx="0">
+            <a:schemeClr val="accent1"/>
+          </a:effectRef>
+          <a:fontRef idx="minor">
+            <a:schemeClr val="lt1"/>
+          </a:fontRef>
+        </p:style>
+        <p:txBody>
+          <a:bodyPr rtlCol="0" anchor="ctr"/>
+          <a:lstStyle/>
+          <a:p>
+            <a:pPr algn="ctr"/>
+            <a:r>
+              <a:rPr lang="en-US" b="1" dirty="0">
+                <a:solidFill>
+                  <a:schemeClr val="tx1"/>
+                </a:solidFill>
+              </a:rPr>
+              <a:t>Max485 Module</a:t>
+            </a:r>
+            <a:endParaRPr lang="en-SG" b="1" dirty="0">
+              <a:solidFill>
+                <a:schemeClr val="tx1"/>
+              </a:solidFill>
+            </a:endParaRPr>
+          </a:p>
+        </p:txBody>
+      </p:sp>
+      <p:sp>
+        <p:nvSpPr>
+          <p:cNvPr id="11" name="Rectangle: Rounded Corners 10">
+            <a:extLst>
+              <a:ext uri="{FF2B5EF4-FFF2-40B4-BE49-F238E27FC236}">
+                <a16:creationId xmlns:a16="http://schemas.microsoft.com/office/drawing/2014/main" id="{2873DFC6-A30E-4022-B040-1448D40CD8C4}"/>
+              </a:ext>
+            </a:extLst>
+          </p:cNvPr>
+          <p:cNvSpPr/>
+          <p:nvPr/>
+        </p:nvSpPr>
+        <p:spPr>
+          <a:xfrm>
+            <a:off x="8983365" y="1299734"/>
+            <a:ext cx="2107964" cy="1158373"/>
+          </a:xfrm>
+          <a:prstGeom prst="roundRect">
+            <a:avLst/>
+          </a:prstGeom>
+          <a:solidFill>
+            <a:srgbClr val="FFC000"/>
+          </a:solidFill>
+        </p:spPr>
+        <p:style>
+          <a:lnRef idx="2">
+            <a:schemeClr val="accent1">
+              <a:shade val="50000"/>
+            </a:schemeClr>
+          </a:lnRef>
+          <a:fillRef idx="1">
+            <a:schemeClr val="accent1"/>
+          </a:fillRef>
+          <a:effectRef idx="0">
+            <a:schemeClr val="accent1"/>
+          </a:effectRef>
+          <a:fontRef idx="minor">
+            <a:schemeClr val="lt1"/>
+          </a:fontRef>
+        </p:style>
+        <p:txBody>
+          <a:bodyPr rtlCol="0" anchor="b" anchorCtr="0"/>
+          <a:lstStyle/>
+          <a:p>
+            <a:pPr algn="ctr"/>
+            <a:r>
+              <a:rPr lang="en-US" sz="2400" b="1" dirty="0">
+                <a:solidFill>
+                  <a:schemeClr val="tx1"/>
+                </a:solidFill>
+              </a:rPr>
+              <a:t>Slave 2</a:t>
+            </a:r>
+            <a:endParaRPr lang="en-SG" sz="2400" b="1" dirty="0">
+              <a:solidFill>
+                <a:schemeClr val="tx1"/>
+              </a:solidFill>
+            </a:endParaRPr>
+          </a:p>
+        </p:txBody>
+      </p:sp>
+      <p:sp>
+        <p:nvSpPr>
+          <p:cNvPr id="12" name="Rectangle 11">
+            <a:extLst>
+              <a:ext uri="{FF2B5EF4-FFF2-40B4-BE49-F238E27FC236}">
+                <a16:creationId xmlns:a16="http://schemas.microsoft.com/office/drawing/2014/main" id="{243435A7-156A-4167-8FF7-6BA692214A69}"/>
+              </a:ext>
+            </a:extLst>
+          </p:cNvPr>
+          <p:cNvSpPr/>
+          <p:nvPr/>
+        </p:nvSpPr>
+        <p:spPr>
+          <a:xfrm>
+            <a:off x="9166679" y="1530322"/>
+            <a:ext cx="1741336" cy="417065"/>
+          </a:xfrm>
+          <a:prstGeom prst="rect">
+            <a:avLst/>
+          </a:prstGeom>
+          <a:noFill/>
+          <a:ln w="38100">
+            <a:solidFill>
+              <a:schemeClr val="tx1"/>
+            </a:solidFill>
+          </a:ln>
+        </p:spPr>
+        <p:style>
+          <a:lnRef idx="2">
+            <a:schemeClr val="accent1">
+              <a:shade val="50000"/>
+            </a:schemeClr>
+          </a:lnRef>
+          <a:fillRef idx="1">
+            <a:schemeClr val="accent1"/>
+          </a:fillRef>
+          <a:effectRef idx="0">
+            <a:schemeClr val="accent1"/>
+          </a:effectRef>
+          <a:fontRef idx="minor">
+            <a:schemeClr val="lt1"/>
+          </a:fontRef>
+        </p:style>
+        <p:txBody>
+          <a:bodyPr rtlCol="0" anchor="ctr"/>
+          <a:lstStyle/>
+          <a:p>
+            <a:pPr algn="ctr"/>
+            <a:r>
+              <a:rPr lang="en-US" b="1" dirty="0">
+                <a:solidFill>
+                  <a:schemeClr val="tx1"/>
+                </a:solidFill>
+              </a:rPr>
+              <a:t>Max485 Module</a:t>
+            </a:r>
+            <a:endParaRPr lang="en-SG" b="1" dirty="0">
+              <a:solidFill>
+                <a:schemeClr val="tx1"/>
+              </a:solidFill>
+            </a:endParaRPr>
+          </a:p>
+        </p:txBody>
+      </p:sp>
+      <p:sp>
+        <p:nvSpPr>
+          <p:cNvPr id="14" name="Rectangle: Rounded Corners 13">
+            <a:extLst>
+              <a:ext uri="{FF2B5EF4-FFF2-40B4-BE49-F238E27FC236}">
+                <a16:creationId xmlns:a16="http://schemas.microsoft.com/office/drawing/2014/main" id="{AAEB9EF1-9264-4B25-9FB6-865CD701D61E}"/>
+              </a:ext>
+            </a:extLst>
+          </p:cNvPr>
+          <p:cNvSpPr/>
+          <p:nvPr/>
+        </p:nvSpPr>
+        <p:spPr>
+          <a:xfrm>
+            <a:off x="8983365" y="3570020"/>
+            <a:ext cx="2107964" cy="1158373"/>
+          </a:xfrm>
+          <a:prstGeom prst="roundRect">
+            <a:avLst/>
+          </a:prstGeom>
+          <a:solidFill>
+            <a:srgbClr val="FFC000"/>
+          </a:solidFill>
+        </p:spPr>
+        <p:style>
+          <a:lnRef idx="2">
+            <a:schemeClr val="accent1">
+              <a:shade val="50000"/>
+            </a:schemeClr>
+          </a:lnRef>
+          <a:fillRef idx="1">
+            <a:schemeClr val="accent1"/>
+          </a:fillRef>
+          <a:effectRef idx="0">
+            <a:schemeClr val="accent1"/>
+          </a:effectRef>
+          <a:fontRef idx="minor">
+            <a:schemeClr val="lt1"/>
+          </a:fontRef>
+        </p:style>
+        <p:txBody>
+          <a:bodyPr rtlCol="0" anchor="b" anchorCtr="0"/>
+          <a:lstStyle/>
+          <a:p>
+            <a:pPr algn="ctr"/>
+            <a:r>
+              <a:rPr lang="en-US" sz="2400" b="1" dirty="0">
+                <a:solidFill>
+                  <a:schemeClr val="tx1"/>
+                </a:solidFill>
+              </a:rPr>
+              <a:t>Slave 3</a:t>
+            </a:r>
+            <a:endParaRPr lang="en-SG" sz="2400" b="1" dirty="0">
+              <a:solidFill>
+                <a:schemeClr val="tx1"/>
+              </a:solidFill>
+            </a:endParaRPr>
+          </a:p>
+        </p:txBody>
+      </p:sp>
+      <p:sp>
+        <p:nvSpPr>
+          <p:cNvPr id="15" name="Rectangle 14">
+            <a:extLst>
+              <a:ext uri="{FF2B5EF4-FFF2-40B4-BE49-F238E27FC236}">
+                <a16:creationId xmlns:a16="http://schemas.microsoft.com/office/drawing/2014/main" id="{98722441-7FDA-4153-9D5A-ADB134A3EA24}"/>
+              </a:ext>
+            </a:extLst>
+          </p:cNvPr>
+          <p:cNvSpPr/>
+          <p:nvPr/>
+        </p:nvSpPr>
+        <p:spPr>
+          <a:xfrm>
+            <a:off x="9166679" y="3800608"/>
+            <a:ext cx="1741336" cy="417065"/>
+          </a:xfrm>
+          <a:prstGeom prst="rect">
+            <a:avLst/>
+          </a:prstGeom>
+          <a:noFill/>
+          <a:ln w="38100">
+            <a:solidFill>
+              <a:schemeClr val="tx1"/>
+            </a:solidFill>
+          </a:ln>
+        </p:spPr>
+        <p:style>
+          <a:lnRef idx="2">
+            <a:schemeClr val="accent1">
+              <a:shade val="50000"/>
+            </a:schemeClr>
+          </a:lnRef>
+          <a:fillRef idx="1">
+            <a:schemeClr val="accent1"/>
+          </a:fillRef>
+          <a:effectRef idx="0">
+            <a:schemeClr val="accent1"/>
+          </a:effectRef>
+          <a:fontRef idx="minor">
+            <a:schemeClr val="lt1"/>
+          </a:fontRef>
+        </p:style>
+        <p:txBody>
+          <a:bodyPr rtlCol="0" anchor="ctr"/>
+          <a:lstStyle/>
+          <a:p>
+            <a:pPr algn="ctr"/>
+            <a:r>
+              <a:rPr lang="en-US" b="1" dirty="0">
+                <a:solidFill>
+                  <a:schemeClr val="tx1"/>
+                </a:solidFill>
+              </a:rPr>
+              <a:t>Max485 Module</a:t>
+            </a:r>
+            <a:endParaRPr lang="en-SG" b="1" dirty="0">
+              <a:solidFill>
+                <a:schemeClr val="tx1"/>
+              </a:solidFill>
+            </a:endParaRPr>
+          </a:p>
+        </p:txBody>
+      </p:sp>
+      <p:sp>
+        <p:nvSpPr>
+          <p:cNvPr id="16" name="Rectangle: Rounded Corners 15">
+            <a:extLst>
+              <a:ext uri="{FF2B5EF4-FFF2-40B4-BE49-F238E27FC236}">
+                <a16:creationId xmlns:a16="http://schemas.microsoft.com/office/drawing/2014/main" id="{6CA4D55B-4EB2-467C-B950-5F04CDAA7E9A}"/>
+              </a:ext>
+            </a:extLst>
+          </p:cNvPr>
+          <p:cNvSpPr/>
+          <p:nvPr/>
+        </p:nvSpPr>
+        <p:spPr>
+          <a:xfrm>
+            <a:off x="4995879" y="569870"/>
+            <a:ext cx="2155050" cy="1920901"/>
+          </a:xfrm>
+          <a:prstGeom prst="roundRect">
+            <a:avLst/>
+          </a:prstGeom>
+          <a:solidFill>
+            <a:srgbClr val="FFC000"/>
+          </a:solidFill>
+        </p:spPr>
+        <p:style>
+          <a:lnRef idx="2">
+            <a:schemeClr val="accent1">
+              <a:shade val="50000"/>
+            </a:schemeClr>
+          </a:lnRef>
+          <a:fillRef idx="1">
+            <a:schemeClr val="accent1"/>
+          </a:fillRef>
+          <a:effectRef idx="0">
+            <a:schemeClr val="accent1"/>
+          </a:effectRef>
+          <a:fontRef idx="minor">
+            <a:schemeClr val="lt1"/>
+          </a:fontRef>
+        </p:style>
+        <p:txBody>
+          <a:bodyPr rtlCol="0" anchor="b" anchorCtr="0"/>
+          <a:lstStyle/>
+          <a:p>
+            <a:pPr algn="ctr"/>
+            <a:r>
+              <a:rPr lang="en-US" sz="2400" b="1" dirty="0">
+                <a:solidFill>
+                  <a:schemeClr val="tx1"/>
+                </a:solidFill>
+              </a:rPr>
+              <a:t>Master</a:t>
+            </a:r>
+            <a:endParaRPr lang="en-SG" sz="2400" b="1" dirty="0">
+              <a:solidFill>
+                <a:schemeClr val="tx1"/>
+              </a:solidFill>
+            </a:endParaRPr>
+          </a:p>
+        </p:txBody>
+      </p:sp>
+      <p:sp>
+        <p:nvSpPr>
+          <p:cNvPr id="17" name="Rectangle 16">
+            <a:extLst>
+              <a:ext uri="{FF2B5EF4-FFF2-40B4-BE49-F238E27FC236}">
+                <a16:creationId xmlns:a16="http://schemas.microsoft.com/office/drawing/2014/main" id="{07AE3A34-3AD2-485A-B699-32423A57C807}"/>
+              </a:ext>
+            </a:extLst>
+          </p:cNvPr>
+          <p:cNvSpPr/>
+          <p:nvPr/>
+        </p:nvSpPr>
+        <p:spPr>
+          <a:xfrm>
+            <a:off x="5207290" y="1344883"/>
+            <a:ext cx="1741336" cy="417065"/>
+          </a:xfrm>
+          <a:prstGeom prst="rect">
+            <a:avLst/>
+          </a:prstGeom>
+          <a:noFill/>
+          <a:ln w="38100">
+            <a:solidFill>
+              <a:schemeClr val="tx1"/>
+            </a:solidFill>
+          </a:ln>
+        </p:spPr>
+        <p:style>
+          <a:lnRef idx="2">
+            <a:schemeClr val="accent1">
+              <a:shade val="50000"/>
+            </a:schemeClr>
+          </a:lnRef>
+          <a:fillRef idx="1">
+            <a:schemeClr val="accent1"/>
+          </a:fillRef>
+          <a:effectRef idx="0">
+            <a:schemeClr val="accent1"/>
+          </a:effectRef>
+          <a:fontRef idx="minor">
+            <a:schemeClr val="lt1"/>
+          </a:fontRef>
+        </p:style>
+        <p:txBody>
+          <a:bodyPr rtlCol="0" anchor="ctr"/>
+          <a:lstStyle/>
+          <a:p>
+            <a:pPr algn="ctr"/>
+            <a:r>
+              <a:rPr lang="en-US" b="1" dirty="0">
+                <a:solidFill>
+                  <a:schemeClr val="tx1"/>
+                </a:solidFill>
+              </a:rPr>
+              <a:t>Max485 Module</a:t>
+            </a:r>
+            <a:endParaRPr lang="en-SG" b="1" dirty="0">
+              <a:solidFill>
+                <a:schemeClr val="tx1"/>
+              </a:solidFill>
+            </a:endParaRPr>
+          </a:p>
+        </p:txBody>
+      </p:sp>
+      <p:cxnSp>
+        <p:nvCxnSpPr>
+          <p:cNvPr id="19" name="Connector: Curved 18">
+            <a:extLst>
+              <a:ext uri="{FF2B5EF4-FFF2-40B4-BE49-F238E27FC236}">
+                <a16:creationId xmlns:a16="http://schemas.microsoft.com/office/drawing/2014/main" id="{44EE2FEE-77AE-4358-9B18-D3E8293EA7FF}"/>
+              </a:ext>
+            </a:extLst>
+          </p:cNvPr>
+          <p:cNvCxnSpPr>
+            <a:cxnSpLocks/>
+            <a:stCxn id="17" idx="0"/>
+            <a:endCxn id="5" idx="3"/>
+          </p:cNvCxnSpPr>
+          <p:nvPr/>
+        </p:nvCxnSpPr>
+        <p:spPr>
+          <a:xfrm rot="16200000" flipH="1" flipV="1">
+            <a:off x="4332058" y="-7046"/>
+            <a:ext cx="393971" cy="3097828"/>
+          </a:xfrm>
+          <a:prstGeom prst="curvedConnector4">
+            <a:avLst>
+              <a:gd name="adj1" fmla="val -58025"/>
+              <a:gd name="adj2" fmla="val 64053"/>
+            </a:avLst>
+          </a:prstGeom>
+          <a:ln w="50800">
+            <a:tailEnd type="stealth" w="lg" len="lg"/>
+          </a:ln>
+        </p:spPr>
+        <p:style>
+          <a:lnRef idx="1">
+            <a:schemeClr val="accent1"/>
+          </a:lnRef>
+          <a:fillRef idx="0">
+            <a:schemeClr val="accent1"/>
+          </a:fillRef>
+          <a:effectRef idx="0">
+            <a:schemeClr val="accent1"/>
+          </a:effectRef>
+          <a:fontRef idx="minor">
+            <a:schemeClr val="tx1"/>
+          </a:fontRef>
+        </p:style>
+      </p:cxnSp>
+      <p:cxnSp>
+        <p:nvCxnSpPr>
+          <p:cNvPr id="21" name="Connector: Curved 20">
+            <a:extLst>
+              <a:ext uri="{FF2B5EF4-FFF2-40B4-BE49-F238E27FC236}">
+                <a16:creationId xmlns:a16="http://schemas.microsoft.com/office/drawing/2014/main" id="{7AD3246C-16D4-4BC9-A097-C492A9B6EC0B}"/>
+              </a:ext>
+            </a:extLst>
+          </p:cNvPr>
+          <p:cNvCxnSpPr>
+            <a:cxnSpLocks/>
+            <a:stCxn id="5" idx="1"/>
+            <a:endCxn id="9" idx="1"/>
+          </p:cNvCxnSpPr>
+          <p:nvPr/>
+        </p:nvCxnSpPr>
+        <p:spPr>
+          <a:xfrm rot="10800000" flipV="1">
+            <a:off x="1238794" y="1738853"/>
+            <a:ext cx="12700" cy="2270287"/>
+          </a:xfrm>
+          <a:prstGeom prst="curvedConnector3">
+            <a:avLst>
+              <a:gd name="adj1" fmla="val 5204189"/>
+            </a:avLst>
+          </a:prstGeom>
+          <a:ln w="50800">
+            <a:tailEnd type="stealth" w="lg" len="lg"/>
+          </a:ln>
+        </p:spPr>
+        <p:style>
+          <a:lnRef idx="1">
+            <a:schemeClr val="accent1"/>
+          </a:lnRef>
+          <a:fillRef idx="0">
+            <a:schemeClr val="accent1"/>
+          </a:fillRef>
+          <a:effectRef idx="0">
+            <a:schemeClr val="accent1"/>
+          </a:effectRef>
+          <a:fontRef idx="minor">
+            <a:schemeClr val="tx1"/>
+          </a:fontRef>
+        </p:style>
+      </p:cxnSp>
+      <p:cxnSp>
+        <p:nvCxnSpPr>
+          <p:cNvPr id="25" name="Connector: Curved 24">
+            <a:extLst>
+              <a:ext uri="{FF2B5EF4-FFF2-40B4-BE49-F238E27FC236}">
+                <a16:creationId xmlns:a16="http://schemas.microsoft.com/office/drawing/2014/main" id="{A1622978-54C0-476C-B48E-EFC89FF944C0}"/>
+              </a:ext>
+            </a:extLst>
+          </p:cNvPr>
+          <p:cNvCxnSpPr>
+            <a:cxnSpLocks/>
+            <a:stCxn id="17" idx="0"/>
+            <a:endCxn id="12" idx="1"/>
+          </p:cNvCxnSpPr>
+          <p:nvPr/>
+        </p:nvCxnSpPr>
+        <p:spPr>
+          <a:xfrm rot="16200000" flipH="1">
+            <a:off x="7425332" y="-2491"/>
+            <a:ext cx="393972" cy="3088721"/>
+          </a:xfrm>
+          <a:prstGeom prst="curvedConnector4">
+            <a:avLst>
+              <a:gd name="adj1" fmla="val -58024"/>
+              <a:gd name="adj2" fmla="val 64094"/>
+            </a:avLst>
+          </a:prstGeom>
+          <a:ln w="50800">
+            <a:tailEnd type="stealth" w="lg" len="lg"/>
+          </a:ln>
+        </p:spPr>
+        <p:style>
+          <a:lnRef idx="1">
+            <a:schemeClr val="accent1"/>
+          </a:lnRef>
+          <a:fillRef idx="0">
+            <a:schemeClr val="accent1"/>
+          </a:fillRef>
+          <a:effectRef idx="0">
+            <a:schemeClr val="accent1"/>
+          </a:effectRef>
+          <a:fontRef idx="minor">
+            <a:schemeClr val="tx1"/>
+          </a:fontRef>
+        </p:style>
+      </p:cxnSp>
+      <p:cxnSp>
+        <p:nvCxnSpPr>
+          <p:cNvPr id="30" name="Connector: Curved 29">
+            <a:extLst>
+              <a:ext uri="{FF2B5EF4-FFF2-40B4-BE49-F238E27FC236}">
+                <a16:creationId xmlns:a16="http://schemas.microsoft.com/office/drawing/2014/main" id="{EB08EAF4-929E-4179-AFCC-A20A6C972A20}"/>
+              </a:ext>
+            </a:extLst>
+          </p:cNvPr>
+          <p:cNvCxnSpPr>
+            <a:cxnSpLocks/>
+            <a:stCxn id="12" idx="3"/>
+            <a:endCxn id="15" idx="3"/>
+          </p:cNvCxnSpPr>
+          <p:nvPr/>
+        </p:nvCxnSpPr>
+        <p:spPr>
+          <a:xfrm>
+            <a:off x="10908015" y="1738855"/>
+            <a:ext cx="12700" cy="2270286"/>
+          </a:xfrm>
+          <a:prstGeom prst="curvedConnector3">
+            <a:avLst>
+              <a:gd name="adj1" fmla="val 5734024"/>
+            </a:avLst>
+          </a:prstGeom>
+          <a:ln w="50800">
+            <a:tailEnd type="stealth" w="lg" len="lg"/>
+          </a:ln>
+        </p:spPr>
+        <p:style>
+          <a:lnRef idx="1">
+            <a:schemeClr val="accent1"/>
+          </a:lnRef>
+          <a:fillRef idx="0">
+            <a:schemeClr val="accent1"/>
+          </a:fillRef>
+          <a:effectRef idx="0">
+            <a:schemeClr val="accent1"/>
+          </a:effectRef>
+          <a:fontRef idx="minor">
+            <a:schemeClr val="tx1"/>
+          </a:fontRef>
+        </p:style>
+      </p:cxnSp>
     </p:spTree>
     <p:extLst>
       <p:ext uri="{BB962C8B-B14F-4D97-AF65-F5344CB8AC3E}">
-        <p14:creationId xmlns:p14="http://schemas.microsoft.com/office/powerpoint/2010/main" val="4261081992"/>
+        <p14:creationId xmlns:p14="http://schemas.microsoft.com/office/powerpoint/2010/main" val="3171845674"/>
       </p:ext>
     </p:extLst>
   </p:cSld>
@@ -2962,6 +3734,72 @@
       </p:grpSpPr>
       <p:sp>
         <p:nvSpPr>
+          <p:cNvPr id="2" name="TextBox 1">
+            <a:extLst>
+              <a:ext uri="{FF2B5EF4-FFF2-40B4-BE49-F238E27FC236}">
+                <a16:creationId xmlns:a16="http://schemas.microsoft.com/office/drawing/2014/main" id="{0C77847F-94E9-45BD-B42B-0F7EA47639CA}"/>
+              </a:ext>
+            </a:extLst>
+          </p:cNvPr>
+          <p:cNvSpPr txBox="1"/>
+          <p:nvPr/>
+        </p:nvSpPr>
+        <p:spPr>
+          <a:xfrm>
+            <a:off x="2048417" y="2105561"/>
+            <a:ext cx="8095165" cy="1323439"/>
+          </a:xfrm>
+          <a:prstGeom prst="rect">
+            <a:avLst/>
+          </a:prstGeom>
+          <a:noFill/>
+        </p:spPr>
+        <p:txBody>
+          <a:bodyPr wrap="none" rtlCol="0">
+            <a:spAutoFit/>
+          </a:bodyPr>
+          <a:lstStyle/>
+          <a:p>
+            <a:r>
+              <a:rPr lang="en-US" sz="8000" dirty="0"/>
+              <a:t>Program Flowchart</a:t>
+            </a:r>
+            <a:endParaRPr lang="en-SG" sz="8000" dirty="0"/>
+          </a:p>
+        </p:txBody>
+      </p:sp>
+    </p:spTree>
+    <p:extLst>
+      <p:ext uri="{BB962C8B-B14F-4D97-AF65-F5344CB8AC3E}">
+        <p14:creationId xmlns:p14="http://schemas.microsoft.com/office/powerpoint/2010/main" val="4261081992"/>
+      </p:ext>
+    </p:extLst>
+  </p:cSld>
+  <p:clrMapOvr>
+    <a:masterClrMapping/>
+  </p:clrMapOvr>
+</p:sld>
+</file>
+
+<file path=ppt/slides/slide12.xml><?xml version="1.0" encoding="utf-8"?>
+<p:sld xmlns:a="http://schemas.openxmlformats.org/drawingml/2006/main" xmlns:r="http://schemas.openxmlformats.org/officeDocument/2006/relationships" xmlns:p="http://schemas.openxmlformats.org/presentationml/2006/main">
+  <p:cSld>
+    <p:spTree>
+      <p:nvGrpSpPr>
+        <p:cNvPr id="1" name=""/>
+        <p:cNvGrpSpPr/>
+        <p:nvPr/>
+      </p:nvGrpSpPr>
+      <p:grpSpPr>
+        <a:xfrm>
+          <a:off x="0" y="0"/>
+          <a:ext cx="0" cy="0"/>
+          <a:chOff x="0" y="0"/>
+          <a:chExt cx="0" cy="0"/>
+        </a:xfrm>
+      </p:grpSpPr>
+      <p:sp>
+        <p:nvSpPr>
           <p:cNvPr id="3" name="Flowchart: Alternate Process 2">
             <a:extLst>
               <a:ext uri="{FF2B5EF4-FFF2-40B4-BE49-F238E27FC236}">
@@ -4007,7 +4845,7 @@
 </p:sld>
 </file>
 
-<file path=ppt/slides/slide12.xml><?xml version="1.0" encoding="utf-8"?>
+<file path=ppt/slides/slide13.xml><?xml version="1.0" encoding="utf-8"?>
 <p:sld xmlns:a="http://schemas.openxmlformats.org/drawingml/2006/main" xmlns:r="http://schemas.openxmlformats.org/officeDocument/2006/relationships" xmlns:p="http://schemas.openxmlformats.org/presentationml/2006/main">
   <p:cSld>
     <p:spTree>
@@ -11751,7 +12589,7 @@
         <p:spPr>
           <a:xfrm>
             <a:off x="1" y="71433"/>
-            <a:ext cx="1489410" cy="400110"/>
+            <a:ext cx="1677724" cy="400110"/>
           </a:xfrm>
           <a:prstGeom prst="rect">
             <a:avLst/>
@@ -11766,7 +12604,7 @@
           <a:p>
             <a:r>
               <a:rPr lang="en-US" sz="2000" dirty="0"/>
-              <a:t>Box 1</a:t>
+              <a:t>Box 1 (RK330)</a:t>
             </a:r>
             <a:endParaRPr lang="en-SG" sz="2000" dirty="0"/>
           </a:p>
@@ -16026,7 +16864,7 @@
         <p:spPr>
           <a:xfrm>
             <a:off x="0" y="71433"/>
-            <a:ext cx="3025785" cy="400110"/>
+            <a:ext cx="1805793" cy="400110"/>
           </a:xfrm>
           <a:prstGeom prst="rect">
             <a:avLst/>
@@ -16041,7 +16879,7 @@
           <a:p>
             <a:r>
               <a:rPr lang="en-US" sz="2000" dirty="0"/>
-              <a:t>Box 1 (change sensor)</a:t>
+              <a:t>Box 1 (DHT22)</a:t>
             </a:r>
             <a:endParaRPr lang="en-SG" sz="2000" dirty="0"/>
           </a:p>
@@ -20531,7 +21369,7 @@
         <p:spPr>
           <a:xfrm>
             <a:off x="0" y="71433"/>
-            <a:ext cx="3025785" cy="400110"/>
+            <a:ext cx="2138901" cy="400110"/>
           </a:xfrm>
           <a:prstGeom prst="rect">
             <a:avLst/>
@@ -20546,7 +21384,7 @@
           <a:p>
             <a:r>
               <a:rPr lang="en-US" sz="2000" dirty="0"/>
-              <a:t>Box 1 (change sensor)</a:t>
+              <a:t>Box 1 (Max31855)</a:t>
             </a:r>
             <a:endParaRPr lang="en-SG" sz="2000" dirty="0"/>
           </a:p>
@@ -25212,7 +26050,7 @@
         <p:spPr>
           <a:xfrm>
             <a:off x="0" y="71433"/>
-            <a:ext cx="3371353" cy="400110"/>
+            <a:ext cx="2911067" cy="400110"/>
           </a:xfrm>
           <a:prstGeom prst="rect">
             <a:avLst/>
@@ -25227,7 +26065,7 @@
           <a:p>
             <a:r>
               <a:rPr lang="en-US" sz="2000" dirty="0"/>
-              <a:t>Box 1 (change sensor, PT100)</a:t>
+              <a:t>Box 1 (Max31865+PT100)</a:t>
             </a:r>
             <a:endParaRPr lang="en-SG" sz="2000" dirty="0"/>
           </a:p>
@@ -25347,7 +26185,7 @@
         </p:nvSpPr>
         <p:spPr>
           <a:xfrm>
-            <a:off x="12377" y="533096"/>
+            <a:off x="33699" y="602995"/>
             <a:ext cx="974882" cy="369332"/>
           </a:xfrm>
           <a:prstGeom prst="rect">
@@ -25385,7 +26223,7 @@
         </p:nvCxnSpPr>
         <p:spPr>
           <a:xfrm>
-            <a:off x="987259" y="717762"/>
+            <a:off x="1008581" y="787661"/>
             <a:ext cx="713912" cy="0"/>
           </a:xfrm>
           <a:prstGeom prst="straightConnector1">
@@ -25430,7 +26268,7 @@
         </p:nvCxnSpPr>
         <p:spPr>
           <a:xfrm flipV="1">
-            <a:off x="8987171" y="707813"/>
+            <a:off x="9008493" y="777712"/>
             <a:ext cx="389779" cy="1"/>
           </a:xfrm>
           <a:prstGeom prst="straightConnector1">
@@ -25472,7 +26310,7 @@
         </p:nvSpPr>
         <p:spPr>
           <a:xfrm>
-            <a:off x="9376950" y="523147"/>
+            <a:off x="9398272" y="593046"/>
             <a:ext cx="548547" cy="369332"/>
           </a:xfrm>
           <a:prstGeom prst="rect">
@@ -25511,7 +26349,7 @@
         </p:nvCxnSpPr>
         <p:spPr>
           <a:xfrm>
-            <a:off x="3170798" y="709345"/>
+            <a:off x="3192120" y="779244"/>
             <a:ext cx="403535" cy="0"/>
           </a:xfrm>
           <a:prstGeom prst="straightConnector1">
@@ -25553,7 +26391,7 @@
         </p:nvSpPr>
         <p:spPr>
           <a:xfrm>
-            <a:off x="1701171" y="360793"/>
+            <a:off x="1722493" y="430692"/>
             <a:ext cx="1461325" cy="713937"/>
           </a:xfrm>
           <a:prstGeom prst="rect">
@@ -25623,7 +26461,7 @@
         </p:nvSpPr>
         <p:spPr>
           <a:xfrm>
-            <a:off x="3574333" y="524679"/>
+            <a:off x="3595655" y="594578"/>
             <a:ext cx="665567" cy="369332"/>
           </a:xfrm>
           <a:prstGeom prst="rect">
@@ -25661,7 +26499,7 @@
         </p:nvCxnSpPr>
         <p:spPr>
           <a:xfrm>
-            <a:off x="7129938" y="709345"/>
+            <a:off x="7151260" y="779244"/>
             <a:ext cx="382180" cy="0"/>
           </a:xfrm>
           <a:prstGeom prst="straightConnector1">
@@ -25703,7 +26541,7 @@
         </p:nvSpPr>
         <p:spPr>
           <a:xfrm>
-            <a:off x="4650323" y="360793"/>
+            <a:off x="4671645" y="430692"/>
             <a:ext cx="1461325" cy="713937"/>
           </a:xfrm>
           <a:prstGeom prst="rect">
@@ -25775,7 +26613,7 @@
         </p:nvCxnSpPr>
         <p:spPr>
           <a:xfrm>
-            <a:off x="4234014" y="709345"/>
+            <a:off x="4255336" y="779244"/>
             <a:ext cx="403535" cy="0"/>
           </a:xfrm>
           <a:prstGeom prst="straightConnector1">
@@ -25817,7 +26655,7 @@
         </p:nvSpPr>
         <p:spPr>
           <a:xfrm>
-            <a:off x="6572788" y="524679"/>
+            <a:off x="6594110" y="594578"/>
             <a:ext cx="548548" cy="369332"/>
           </a:xfrm>
           <a:prstGeom prst="rect">
@@ -25856,7 +26694,7 @@
         </p:nvCxnSpPr>
         <p:spPr>
           <a:xfrm>
-            <a:off x="6132098" y="709345"/>
+            <a:off x="6153420" y="779244"/>
             <a:ext cx="440690" cy="0"/>
           </a:xfrm>
           <a:prstGeom prst="straightConnector1">
@@ -25898,7 +26736,7 @@
         </p:nvSpPr>
         <p:spPr>
           <a:xfrm>
-            <a:off x="7512118" y="356654"/>
+            <a:off x="7533440" y="426553"/>
             <a:ext cx="1461325" cy="713937"/>
           </a:xfrm>
           <a:prstGeom prst="rect">
@@ -30913,8 +31751,8 @@
         </p:nvSpPr>
         <p:spPr>
           <a:xfrm>
-            <a:off x="0" y="71433"/>
-            <a:ext cx="3371353" cy="400110"/>
+            <a:off x="-5221" y="48334"/>
+            <a:ext cx="3760251" cy="400110"/>
           </a:xfrm>
           <a:prstGeom prst="rect">
             <a:avLst/>
@@ -30929,7 +31767,7 @@
           <a:p>
             <a:r>
               <a:rPr lang="en-US" sz="2000" dirty="0"/>
-              <a:t>Box 2 (Mega)</a:t>
+              <a:t>Box 2 (Mega, Max31865+PT100)</a:t>
             </a:r>
             <a:endParaRPr lang="en-SG" sz="2000" dirty="0"/>
           </a:p>
@@ -31016,7 +31854,7 @@
                   <a:schemeClr val="tx1"/>
                 </a:solidFill>
               </a:rPr>
-              <a:t>Sub Controller (Uno)</a:t>
+              <a:t>Sub Controller (Uno) 4</a:t>
             </a:r>
             <a:endParaRPr lang="en-SG" sz="2400" b="1" dirty="0">
               <a:solidFill>
@@ -31077,7 +31915,7 @@
                   <a:schemeClr val="tx1"/>
                 </a:solidFill>
               </a:rPr>
-              <a:t>Sub Controller (Uno)</a:t>
+              <a:t>Sub Controller (Uno) 3</a:t>
             </a:r>
             <a:endParaRPr lang="en-SG" sz="2400" b="1" dirty="0">
               <a:solidFill>
@@ -31138,7 +31976,7 @@
                   <a:schemeClr val="tx1"/>
                 </a:solidFill>
               </a:rPr>
-              <a:t>Sub Controller (Uno)</a:t>
+              <a:t>Sub Controller (Uno) 2</a:t>
             </a:r>
             <a:endParaRPr lang="en-SG" sz="2400" b="1" dirty="0">
               <a:solidFill>
@@ -31260,7 +32098,7 @@
                   <a:schemeClr val="tx1"/>
                 </a:solidFill>
               </a:rPr>
-              <a:t>Sub Controller (Uno)</a:t>
+              <a:t>Sub Controller (Uno) 1</a:t>
             </a:r>
             <a:endParaRPr lang="en-SG" sz="2400" b="1" dirty="0">
               <a:solidFill>
@@ -31284,7 +32122,7 @@
         </p:nvSpPr>
         <p:spPr>
           <a:xfrm>
-            <a:off x="115042" y="381000"/>
+            <a:off x="76942" y="400253"/>
             <a:ext cx="974882" cy="369332"/>
           </a:xfrm>
           <a:prstGeom prst="rect">
@@ -31322,8 +32160,8 @@
         </p:nvCxnSpPr>
         <p:spPr>
           <a:xfrm>
-            <a:off x="1089924" y="381000"/>
-            <a:ext cx="0" cy="489742"/>
+            <a:off x="1089924" y="457200"/>
+            <a:ext cx="0" cy="413542"/>
           </a:xfrm>
           <a:prstGeom prst="straightConnector1">
             <a:avLst/>
@@ -31960,7 +32798,7 @@
                   <a:schemeClr val="tx1"/>
                 </a:solidFill>
               </a:rPr>
-              <a:t>Module</a:t>
+              <a:t>Module1</a:t>
             </a:r>
             <a:endParaRPr lang="en-SG" b="1" dirty="0">
               <a:solidFill>
@@ -31984,7 +32822,7 @@
         </p:nvSpPr>
         <p:spPr>
           <a:xfrm>
-            <a:off x="4104408" y="2479709"/>
+            <a:off x="4128122" y="2668446"/>
             <a:ext cx="1440349" cy="270723"/>
           </a:xfrm>
           <a:prstGeom prst="leftRightArrow">
@@ -33039,7 +33877,7 @@
                   <a:schemeClr val="tx1"/>
                 </a:solidFill>
               </a:rPr>
-              <a:t>Module</a:t>
+              <a:t>Module2</a:t>
             </a:r>
             <a:endParaRPr lang="en-SG" b="1" dirty="0">
               <a:solidFill>
@@ -33114,7 +33952,7 @@
                   <a:schemeClr val="tx1"/>
                 </a:solidFill>
               </a:rPr>
-              <a:t>Module</a:t>
+              <a:t>Module3</a:t>
             </a:r>
             <a:endParaRPr lang="en-SG" b="1" dirty="0">
               <a:solidFill>
@@ -33189,13 +34027,187 @@
                   <a:schemeClr val="tx1"/>
                 </a:solidFill>
               </a:rPr>
-              <a:t>Module</a:t>
+              <a:t>Module4</a:t>
             </a:r>
             <a:endParaRPr lang="en-SG" b="1" dirty="0">
               <a:solidFill>
                 <a:schemeClr val="tx1"/>
               </a:solidFill>
             </a:endParaRPr>
+          </a:p>
+        </p:txBody>
+      </p:sp>
+      <p:sp>
+        <p:nvSpPr>
+          <p:cNvPr id="43" name="Arrow: Left-Right 42">
+            <a:extLst>
+              <a:ext uri="{FF2B5EF4-FFF2-40B4-BE49-F238E27FC236}">
+                <a16:creationId xmlns:a16="http://schemas.microsoft.com/office/drawing/2014/main" id="{46B0B08E-61B3-4AF4-A80C-01A0B04C6148}"/>
+              </a:ext>
+            </a:extLst>
+          </p:cNvPr>
+          <p:cNvSpPr/>
+          <p:nvPr/>
+        </p:nvSpPr>
+        <p:spPr>
+          <a:xfrm>
+            <a:off x="4310941" y="4278935"/>
+            <a:ext cx="1440349" cy="270723"/>
+          </a:xfrm>
+          <a:prstGeom prst="leftRightArrow">
+            <a:avLst/>
+          </a:prstGeom>
+        </p:spPr>
+        <p:style>
+          <a:lnRef idx="2">
+            <a:schemeClr val="accent1">
+              <a:shade val="50000"/>
+            </a:schemeClr>
+          </a:lnRef>
+          <a:fillRef idx="1">
+            <a:schemeClr val="accent1"/>
+          </a:fillRef>
+          <a:effectRef idx="0">
+            <a:schemeClr val="accent1"/>
+          </a:effectRef>
+          <a:fontRef idx="minor">
+            <a:schemeClr val="lt1"/>
+          </a:fontRef>
+        </p:style>
+        <p:txBody>
+          <a:bodyPr rtlCol="0" anchor="ctr"/>
+          <a:lstStyle/>
+          <a:p>
+            <a:pPr algn="ctr"/>
+            <a:endParaRPr lang="en-SG"/>
+          </a:p>
+        </p:txBody>
+      </p:sp>
+      <p:sp>
+        <p:nvSpPr>
+          <p:cNvPr id="44" name="Arrow: Left-Right 43">
+            <a:extLst>
+              <a:ext uri="{FF2B5EF4-FFF2-40B4-BE49-F238E27FC236}">
+                <a16:creationId xmlns:a16="http://schemas.microsoft.com/office/drawing/2014/main" id="{F06ABC71-0BC3-4730-882F-DF5597283008}"/>
+              </a:ext>
+            </a:extLst>
+          </p:cNvPr>
+          <p:cNvSpPr/>
+          <p:nvPr/>
+        </p:nvSpPr>
+        <p:spPr>
+          <a:xfrm>
+            <a:off x="4836733" y="5023969"/>
+            <a:ext cx="1440349" cy="270723"/>
+          </a:xfrm>
+          <a:prstGeom prst="leftRightArrow">
+            <a:avLst/>
+          </a:prstGeom>
+        </p:spPr>
+        <p:style>
+          <a:lnRef idx="2">
+            <a:schemeClr val="accent1">
+              <a:shade val="50000"/>
+            </a:schemeClr>
+          </a:lnRef>
+          <a:fillRef idx="1">
+            <a:schemeClr val="accent1"/>
+          </a:fillRef>
+          <a:effectRef idx="0">
+            <a:schemeClr val="accent1"/>
+          </a:effectRef>
+          <a:fontRef idx="minor">
+            <a:schemeClr val="lt1"/>
+          </a:fontRef>
+        </p:style>
+        <p:txBody>
+          <a:bodyPr rtlCol="0" anchor="ctr"/>
+          <a:lstStyle/>
+          <a:p>
+            <a:pPr algn="ctr"/>
+            <a:endParaRPr lang="en-SG"/>
+          </a:p>
+        </p:txBody>
+      </p:sp>
+      <p:sp>
+        <p:nvSpPr>
+          <p:cNvPr id="47" name="Arrow: Left-Right 46">
+            <a:extLst>
+              <a:ext uri="{FF2B5EF4-FFF2-40B4-BE49-F238E27FC236}">
+                <a16:creationId xmlns:a16="http://schemas.microsoft.com/office/drawing/2014/main" id="{587A653C-1459-4C46-B766-966D162BDB61}"/>
+              </a:ext>
+            </a:extLst>
+          </p:cNvPr>
+          <p:cNvSpPr/>
+          <p:nvPr/>
+        </p:nvSpPr>
+        <p:spPr>
+          <a:xfrm>
+            <a:off x="5379498" y="5760949"/>
+            <a:ext cx="1440349" cy="270723"/>
+          </a:xfrm>
+          <a:prstGeom prst="leftRightArrow">
+            <a:avLst/>
+          </a:prstGeom>
+        </p:spPr>
+        <p:style>
+          <a:lnRef idx="2">
+            <a:schemeClr val="accent1">
+              <a:shade val="50000"/>
+            </a:schemeClr>
+          </a:lnRef>
+          <a:fillRef idx="1">
+            <a:schemeClr val="accent1"/>
+          </a:fillRef>
+          <a:effectRef idx="0">
+            <a:schemeClr val="accent1"/>
+          </a:effectRef>
+          <a:fontRef idx="minor">
+            <a:schemeClr val="lt1"/>
+          </a:fontRef>
+        </p:style>
+        <p:txBody>
+          <a:bodyPr rtlCol="0" anchor="ctr"/>
+          <a:lstStyle/>
+          <a:p>
+            <a:pPr algn="ctr"/>
+            <a:endParaRPr lang="en-SG"/>
+          </a:p>
+        </p:txBody>
+      </p:sp>
+      <p:sp>
+        <p:nvSpPr>
+          <p:cNvPr id="49" name="TextBox 48">
+            <a:extLst>
+              <a:ext uri="{FF2B5EF4-FFF2-40B4-BE49-F238E27FC236}">
+                <a16:creationId xmlns:a16="http://schemas.microsoft.com/office/drawing/2014/main" id="{474FF590-E31E-422E-913C-1B1405B1D36C}"/>
+              </a:ext>
+            </a:extLst>
+          </p:cNvPr>
+          <p:cNvSpPr txBox="1"/>
+          <p:nvPr/>
+        </p:nvSpPr>
+        <p:spPr>
+          <a:xfrm>
+            <a:off x="0" y="71433"/>
+            <a:ext cx="2455224" cy="400110"/>
+          </a:xfrm>
+          <a:prstGeom prst="rect">
+            <a:avLst/>
+          </a:prstGeom>
+          <a:noFill/>
+        </p:spPr>
+        <p:txBody>
+          <a:bodyPr wrap="none" rtlCol="0">
+            <a:spAutoFit/>
+          </a:bodyPr>
+          <a:lstStyle/>
+          <a:p>
+            <a:r>
+              <a:rPr lang="en-US" sz="2000" dirty="0"/>
+              <a:t>Distributed Controller</a:t>
+            </a:r>
+            <a:endParaRPr lang="en-SG" sz="2000" dirty="0"/>
           </a:p>
         </p:txBody>
       </p:sp>
@@ -35771,7 +36783,7 @@
             <a:solidFill>
               <a:schemeClr val="tx1"/>
             </a:solidFill>
-            <a:prstDash val="dash"/>
+            <a:prstDash val="solid"/>
           </a:ln>
         </p:spPr>
         <p:style>
@@ -38166,15 +39178,6 @@
 </file>
 
 <file path=customXml/item1.xml><?xml version="1.0" encoding="utf-8"?>
-<?mso-contentType ?>
-<FormTemplates xmlns="http://schemas.microsoft.com/sharepoint/v3/contenttype/forms">
-  <Display>DocumentLibraryForm</Display>
-  <Edit>DocumentLibraryForm</Edit>
-  <New>DocumentLibraryForm</New>
-</FormTemplates>
-</file>
-
-<file path=customXml/item2.xml><?xml version="1.0" encoding="utf-8"?>
 <ct:contentTypeSchema xmlns:ct="http://schemas.microsoft.com/office/2006/metadata/contentType" xmlns:ma="http://schemas.microsoft.com/office/2006/metadata/properties/metaAttributes" ct:_="" ma:_="" ma:contentTypeName="Document" ma:contentTypeID="0x010100E6E1031C48018C4292DBDBD68C3F63E2" ma:contentTypeVersion="6" ma:contentTypeDescription="Create a new document." ma:contentTypeScope="" ma:versionID="9ae9a2a5b07300798953ecdd28312694">
   <xsd:schema xmlns:xsd="http://www.w3.org/2001/XMLSchema" xmlns:xs="http://www.w3.org/2001/XMLSchema" xmlns:p="http://schemas.microsoft.com/office/2006/metadata/properties" xmlns:ns2="0ad04f26-a780-43bf-835f-b79ff52a29dc" xmlns:ns3="a1518579-73ee-42fe-aa96-2836fc14ff9f" xmlns:ns4="d1583c34-73a0-4f2f-ba6b-1ac8359f2b78" targetNamespace="http://schemas.microsoft.com/office/2006/metadata/properties" ma:root="true" ma:fieldsID="9faae2f6251647047d77e859e5fe7bf2" ns2:_="" ns3:_="" ns4:_="">
     <xsd:import namespace="0ad04f26-a780-43bf-835f-b79ff52a29dc"/>
@@ -38383,7 +39386,40 @@
 </ct:contentTypeSchema>
 </file>
 
+<file path=customXml/item2.xml><?xml version="1.0" encoding="utf-8"?>
+<?mso-contentType ?>
+<FormTemplates xmlns="http://schemas.microsoft.com/sharepoint/v3/contenttype/forms">
+  <Display>DocumentLibraryForm</Display>
+  <Edit>DocumentLibraryForm</Edit>
+  <New>DocumentLibraryForm</New>
+</FormTemplates>
+</file>
+
 <file path=customXml/item3.xml><?xml version="1.0" encoding="utf-8"?>
+<p:properties xmlns:p="http://schemas.microsoft.com/office/2006/metadata/properties" xmlns:xsi="http://www.w3.org/2001/XMLSchema-instance" xmlns:pc="http://schemas.microsoft.com/office/infopath/2007/PartnerControls">
+  <documentManagement>
+    <SharedWithUsers xmlns="d1583c34-73a0-4f2f-ba6b-1ac8359f2b78">
+      <UserInfo>
+        <DisplayName>Karen Boh Lee Gek</DisplayName>
+        <AccountId>1403</AccountId>
+        <AccountType/>
+      </UserInfo>
+      <UserInfo>
+        <DisplayName>Kris Chur San Yee</DisplayName>
+        <AccountId>1798</AccountId>
+        <AccountType/>
+      </UserInfo>
+    </SharedWithUsers>
+    <_dlc_DocId xmlns="0ad04f26-a780-43bf-835f-b79ff52a29dc">U3ZV22ZJXESJ-1142709787-4964</_dlc_DocId>
+    <_dlc_DocIdUrl xmlns="0ad04f26-a780-43bf-835f-b79ff52a29dc">
+      <Url>https://sitsingaporetechedu.sharepoint.com/sites/PO/Leads/_layouts/15/DocIdRedir.aspx?ID=U3ZV22ZJXESJ-1142709787-4964</Url>
+      <Description>U3ZV22ZJXESJ-1142709787-4964</Description>
+    </_dlc_DocIdUrl>
+  </documentManagement>
+</p:properties>
+</file>
+
+<file path=customXml/item4.xml><?xml version="1.0" encoding="utf-8"?>
 <?mso-contentType ?>
 <spe:Receivers xmlns:spe="http://schemas.microsoft.com/sharepoint/events">
   <Receiver>
@@ -38433,39 +39469,7 @@
 </spe:Receivers>
 </file>
 
-<file path=customXml/item4.xml><?xml version="1.0" encoding="utf-8"?>
-<p:properties xmlns:p="http://schemas.microsoft.com/office/2006/metadata/properties" xmlns:xsi="http://www.w3.org/2001/XMLSchema-instance" xmlns:pc="http://schemas.microsoft.com/office/infopath/2007/PartnerControls">
-  <documentManagement>
-    <SharedWithUsers xmlns="d1583c34-73a0-4f2f-ba6b-1ac8359f2b78">
-      <UserInfo>
-        <DisplayName>Karen Boh Lee Gek</DisplayName>
-        <AccountId>1403</AccountId>
-        <AccountType/>
-      </UserInfo>
-      <UserInfo>
-        <DisplayName>Kris Chur San Yee</DisplayName>
-        <AccountId>1798</AccountId>
-        <AccountType/>
-      </UserInfo>
-    </SharedWithUsers>
-    <_dlc_DocId xmlns="0ad04f26-a780-43bf-835f-b79ff52a29dc">U3ZV22ZJXESJ-1142709787-4964</_dlc_DocId>
-    <_dlc_DocIdUrl xmlns="0ad04f26-a780-43bf-835f-b79ff52a29dc">
-      <Url>https://sitsingaporetechedu.sharepoint.com/sites/PO/Leads/_layouts/15/DocIdRedir.aspx?ID=U3ZV22ZJXESJ-1142709787-4964</Url>
-      <Description>U3ZV22ZJXESJ-1142709787-4964</Description>
-    </_dlc_DocIdUrl>
-  </documentManagement>
-</p:properties>
-</file>
-
 <file path=customXml/itemProps1.xml><?xml version="1.0" encoding="utf-8"?>
-<ds:datastoreItem xmlns:ds="http://schemas.openxmlformats.org/officeDocument/2006/customXml" ds:itemID="{7D7D58FF-6E5B-409D-8B4D-B0E0073025D5}">
-  <ds:schemaRefs>
-    <ds:schemaRef ds:uri="http://schemas.microsoft.com/sharepoint/v3/contenttype/forms"/>
-  </ds:schemaRefs>
-</ds:datastoreItem>
-</file>
-
-<file path=customXml/itemProps2.xml><?xml version="1.0" encoding="utf-8"?>
 <ds:datastoreItem xmlns:ds="http://schemas.openxmlformats.org/officeDocument/2006/customXml" ds:itemID="{C20F4E18-A5EC-4A34-B7AA-397D2B188B6A}">
   <ds:schemaRefs>
     <ds:schemaRef ds:uri="http://schemas.microsoft.com/office/2006/metadata/contentType"/>
@@ -38485,15 +39489,15 @@
 </ds:datastoreItem>
 </file>
 
-<file path=customXml/itemProps3.xml><?xml version="1.0" encoding="utf-8"?>
-<ds:datastoreItem xmlns:ds="http://schemas.openxmlformats.org/officeDocument/2006/customXml" ds:itemID="{DBE60198-3F54-4377-AFC2-746F792EC1FE}">
+<file path=customXml/itemProps2.xml><?xml version="1.0" encoding="utf-8"?>
+<ds:datastoreItem xmlns:ds="http://schemas.openxmlformats.org/officeDocument/2006/customXml" ds:itemID="{7D7D58FF-6E5B-409D-8B4D-B0E0073025D5}">
   <ds:schemaRefs>
-    <ds:schemaRef ds:uri="http://schemas.microsoft.com/sharepoint/events"/>
+    <ds:schemaRef ds:uri="http://schemas.microsoft.com/sharepoint/v3/contenttype/forms"/>
   </ds:schemaRefs>
 </ds:datastoreItem>
 </file>
 
-<file path=customXml/itemProps4.xml><?xml version="1.0" encoding="utf-8"?>
+<file path=customXml/itemProps3.xml><?xml version="1.0" encoding="utf-8"?>
 <ds:datastoreItem xmlns:ds="http://schemas.openxmlformats.org/officeDocument/2006/customXml" ds:itemID="{07B7BCB4-6752-4067-9BBF-537E18945997}">
   <ds:schemaRefs>
     <ds:schemaRef ds:uri="http://schemas.microsoft.com/office/2006/documentManagement/types"/>
@@ -38509,4 +39513,12 @@
     <ds:schemaRef ds:uri="http://purl.org/dc/dcmitype/"/>
   </ds:schemaRefs>
 </ds:datastoreItem>
+</file>
+
+<file path=customXml/itemProps4.xml><?xml version="1.0" encoding="utf-8"?>
+<ds:datastoreItem xmlns:ds="http://schemas.openxmlformats.org/officeDocument/2006/customXml" ds:itemID="{DBE60198-3F54-4377-AFC2-746F792EC1FE}">
+  <ds:schemaRefs>
+    <ds:schemaRef ds:uri="http://schemas.microsoft.com/sharepoint/events"/>
+  </ds:schemaRefs>
+</ds:datastoreItem>
 </file>
</xml_diff>